<commit_message>
a bit of progress on assignment6 sql queries
</commit_message>
<xml_diff>
--- a/cs622_materials/Concurrency Control and Safety.pptx
+++ b/cs622_materials/Concurrency Control and Safety.pptx
@@ -188,6 +188,33 @@
 </p188:authorLst>
 </file>
 
+<file path=ppt/comments/modernComment_117_0.xml><?xml version="1.0" encoding="utf-8"?>
+<p188:cmLst xmlns:a="http://schemas.openxmlformats.org/drawingml/2006/main" xmlns:r="http://schemas.openxmlformats.org/officeDocument/2006/relationships" xmlns:p188="http://schemas.microsoft.com/office/powerpoint/2018/8/main">
+  <p188:cm id="{637AFD52-2392-41BE-AC3D-3B45E4D4BA9B}" authorId="{54AC2949-DE10-DF52-009D-098EBEC026D7}" created="2022-02-11T02:50:06.433">
+    <ac:txMkLst xmlns:ac="http://schemas.microsoft.com/office/drawing/2013/main/command">
+      <pc:docMk xmlns:pc="http://schemas.microsoft.com/office/powerpoint/2013/main/command"/>
+      <pc:sldMk xmlns:pc="http://schemas.microsoft.com/office/powerpoint/2013/main/command" cId="0" sldId="279"/>
+      <ac:spMk id="21506" creationId="{00000000-0000-0000-0000-000000000000}"/>
+      <ac:txMk cp="0" len="3">
+        <ac:context len="4" hash="2602756"/>
+      </ac:txMk>
+    </ac:txMkLst>
+    <p188:pos x="5982346" y="729980"/>
+    <p188:txBody>
+      <a:bodyPr/>
+      <a:lstStyle/>
+      <a:p>
+        <a:r>
+          <a:rPr lang="en-US"/>
+          <a:t>thread are use if you're doing something BEEFY and you want to improve performance
+also used when you for CONTINUITY, like video buffering is an example of this, you partially load something then have background tasks </a:t>
+        </a:r>
+      </a:p>
+    </p188:txBody>
+  </p188:cm>
+</p188:cmLst>
+</file>
+
 <file path=ppt/comments/modernComment_212_5B0ABEFC.xml><?xml version="1.0" encoding="utf-8"?>
 <p188:cmLst xmlns:a="http://schemas.openxmlformats.org/drawingml/2006/main" xmlns:r="http://schemas.openxmlformats.org/officeDocument/2006/relationships" xmlns:p188="http://schemas.microsoft.com/office/powerpoint/2018/8/main">
   <p188:cm id="{780A0217-7E79-4777-983E-C5146E339896}" authorId="{54AC2949-DE10-DF52-009D-098EBEC026D7}" created="2022-02-11T02:21:16.756">
@@ -337,6 +364,84 @@
         <a:r>
           <a:rPr lang="en-US"/>
           <a:t>Doesn't matter which thread gets locked, as long as both threads LOCK THE SAME THREAD</a:t>
+        </a:r>
+      </a:p>
+    </p188:txBody>
+  </p188:cm>
+</p188:cmLst>
+</file>
+
+<file path=ppt/comments/modernComment_220_899768CB.xml><?xml version="1.0" encoding="utf-8"?>
+<p188:cmLst xmlns:a="http://schemas.openxmlformats.org/drawingml/2006/main" xmlns:r="http://schemas.openxmlformats.org/officeDocument/2006/relationships" xmlns:p188="http://schemas.microsoft.com/office/powerpoint/2018/8/main">
+  <p188:cm id="{729D05E2-47EB-4EFD-BAB8-A5526FB75290}" authorId="{54AC2949-DE10-DF52-009D-098EBEC026D7}" created="2022-02-11T02:33:25.761">
+    <ac:txMkLst xmlns:ac="http://schemas.microsoft.com/office/drawing/2013/main/command">
+      <pc:docMk xmlns:pc="http://schemas.microsoft.com/office/powerpoint/2013/main/command"/>
+      <pc:sldMk xmlns:pc="http://schemas.microsoft.com/office/powerpoint/2013/main/command" cId="2308401355" sldId="544"/>
+      <ac:spMk id="6" creationId="{07088D6D-0A98-445E-B06B-80F4559410F4}"/>
+      <ac:txMk cp="591" len="12">
+        <ac:context len="663" hash="3528730494"/>
+      </ac:txMk>
+    </ac:txMkLst>
+    <p188:pos x="2072525" y="3889480"/>
+    <p188:txBody>
+      <a:bodyPr/>
+      <a:lstStyle/>
+      <a:p>
+        <a:r>
+          <a:rPr lang="en-US"/>
+          <a:t>Although this is possible, you want to limit your synchronization to the smallest possible scope -&gt; the longer your thread is synchronized the longer other threads have to wait to access the variables within the synchronized portions of code</a:t>
+        </a:r>
+      </a:p>
+    </p188:txBody>
+  </p188:cm>
+</p188:cmLst>
+</file>
+
+<file path=ppt/comments/modernComment_221_87E5407.xml><?xml version="1.0" encoding="utf-8"?>
+<p188:cmLst xmlns:a="http://schemas.openxmlformats.org/drawingml/2006/main" xmlns:r="http://schemas.openxmlformats.org/officeDocument/2006/relationships" xmlns:p188="http://schemas.microsoft.com/office/powerpoint/2018/8/main">
+  <p188:cm id="{3A2BAADA-BD33-44CC-8657-9C8277200C1C}" authorId="{54AC2949-DE10-DF52-009D-098EBEC026D7}" created="2022-02-11T02:40:28.580">
+    <ac:txMkLst xmlns:ac="http://schemas.microsoft.com/office/drawing/2013/main/command">
+      <pc:docMk xmlns:pc="http://schemas.microsoft.com/office/powerpoint/2013/main/command"/>
+      <pc:sldMk xmlns:pc="http://schemas.microsoft.com/office/powerpoint/2013/main/command" cId="142496775" sldId="545"/>
+      <ac:spMk id="2" creationId="{A9292AFA-16E3-4041-BF46-EEC37A93BDD7}"/>
+      <ac:txMk cp="10" len="6">
+        <ac:context len="17" hash="2404101646"/>
+      </ac:txMk>
+    </ac:txMkLst>
+    <p188:pos x="7697492" y="515776"/>
+    <p188:txBody>
+      <a:bodyPr/>
+      <a:lstStyle/>
+      <a:p>
+        <a:r>
+          <a:rPr lang="en-US"/>
+          <a:t>notify needs to happen after the wait </a:t>
+        </a:r>
+      </a:p>
+    </p188:txBody>
+  </p188:cm>
+</p188:cmLst>
+</file>
+
+<file path=ppt/comments/modernComment_222_EC49F8AA.xml><?xml version="1.0" encoding="utf-8"?>
+<p188:cmLst xmlns:a="http://schemas.openxmlformats.org/drawingml/2006/main" xmlns:r="http://schemas.openxmlformats.org/officeDocument/2006/relationships" xmlns:p188="http://schemas.microsoft.com/office/powerpoint/2018/8/main">
+  <p188:cm id="{6B27B861-628D-4DF8-A626-A4422AA71431}" authorId="{54AC2949-DE10-DF52-009D-098EBEC026D7}" created="2022-02-11T02:45:35.872">
+    <ac:txMkLst xmlns:ac="http://schemas.microsoft.com/office/drawing/2013/main/command">
+      <pc:docMk xmlns:pc="http://schemas.microsoft.com/office/powerpoint/2013/main/command"/>
+      <pc:sldMk xmlns:pc="http://schemas.microsoft.com/office/powerpoint/2013/main/command" cId="3964270762" sldId="546"/>
+      <ac:spMk id="6" creationId="{07088D6D-0A98-445E-B06B-80F4559410F4}"/>
+      <ac:txMk cp="195" len="135">
+        <ac:context len="1093" hash="3066515999"/>
+      </ac:txMk>
+    </ac:txMkLst>
+    <p188:pos x="5327169" y="1080213"/>
+    <p188:txBody>
+      <a:bodyPr/>
+      <a:lstStyle/>
+      <a:p>
+        <a:r>
+          <a:rPr lang="en-US"/>
+          <a:t>The cause of the deadlock is that these are swapped in the constructor. Ensure the same order - the JVM does not avoid deadlocks (databases do though) </a:t>
         </a:r>
       </a:p>
     </p188:txBody>
@@ -10131,7 +10236,7 @@
               <a:pPr>
                 <a:defRPr/>
               </a:pPr>
-              <a:t>2/10/2022</a:t>
+              <a:t>2/16/2022</a:t>
             </a:fld>
             <a:endParaRPr lang="en-US"/>
           </a:p>
@@ -10355,7 +10460,7 @@
               <a:pPr>
                 <a:defRPr/>
               </a:pPr>
-              <a:t>2/10/2022</a:t>
+              <a:t>2/16/2022</a:t>
             </a:fld>
             <a:endParaRPr lang="en-US"/>
           </a:p>
@@ -10573,7 +10678,7 @@
           <a:p>
             <a:fld id="{9454E242-1075-47E0-A162-55C960B37C1C}" type="datetimeFigureOut">
               <a:rPr lang="en-US" smtClean="0"/>
-              <a:t>2/10/2022</a:t>
+              <a:t>2/16/2022</a:t>
             </a:fld>
             <a:endParaRPr lang="en-US"/>
           </a:p>
@@ -10741,7 +10846,7 @@
           <a:p>
             <a:fld id="{9454E242-1075-47E0-A162-55C960B37C1C}" type="datetimeFigureOut">
               <a:rPr lang="en-US" smtClean="0"/>
-              <a:t>2/10/2022</a:t>
+              <a:t>2/16/2022</a:t>
             </a:fld>
             <a:endParaRPr lang="en-US"/>
           </a:p>
@@ -10986,7 +11091,7 @@
           <a:p>
             <a:fld id="{9454E242-1075-47E0-A162-55C960B37C1C}" type="datetimeFigureOut">
               <a:rPr lang="en-US" smtClean="0"/>
-              <a:t>2/10/2022</a:t>
+              <a:t>2/16/2022</a:t>
             </a:fld>
             <a:endParaRPr lang="en-US"/>
           </a:p>
@@ -11215,7 +11320,7 @@
           <a:p>
             <a:fld id="{9454E242-1075-47E0-A162-55C960B37C1C}" type="datetimeFigureOut">
               <a:rPr lang="en-US" smtClean="0"/>
-              <a:t>2/10/2022</a:t>
+              <a:t>2/16/2022</a:t>
             </a:fld>
             <a:endParaRPr lang="en-US"/>
           </a:p>
@@ -11579,7 +11684,7 @@
           <a:p>
             <a:fld id="{9454E242-1075-47E0-A162-55C960B37C1C}" type="datetimeFigureOut">
               <a:rPr lang="en-US" smtClean="0"/>
-              <a:t>2/10/2022</a:t>
+              <a:t>2/16/2022</a:t>
             </a:fld>
             <a:endParaRPr lang="en-US"/>
           </a:p>
@@ -11696,7 +11801,7 @@
           <a:p>
             <a:fld id="{9454E242-1075-47E0-A162-55C960B37C1C}" type="datetimeFigureOut">
               <a:rPr lang="en-US" smtClean="0"/>
-              <a:t>2/10/2022</a:t>
+              <a:t>2/16/2022</a:t>
             </a:fld>
             <a:endParaRPr lang="en-US"/>
           </a:p>
@@ -11791,7 +11896,7 @@
           <a:p>
             <a:fld id="{9454E242-1075-47E0-A162-55C960B37C1C}" type="datetimeFigureOut">
               <a:rPr lang="en-US" smtClean="0"/>
-              <a:t>2/10/2022</a:t>
+              <a:t>2/16/2022</a:t>
             </a:fld>
             <a:endParaRPr lang="en-US"/>
           </a:p>
@@ -12066,7 +12171,7 @@
           <a:p>
             <a:fld id="{9454E242-1075-47E0-A162-55C960B37C1C}" type="datetimeFigureOut">
               <a:rPr lang="en-US" smtClean="0"/>
-              <a:t>2/10/2022</a:t>
+              <a:t>2/16/2022</a:t>
             </a:fld>
             <a:endParaRPr lang="en-US"/>
           </a:p>
@@ -12583,7 +12688,7 @@
           <a:p>
             <a:fld id="{9454E242-1075-47E0-A162-55C960B37C1C}" type="datetimeFigureOut">
               <a:rPr lang="en-US" smtClean="0"/>
-              <a:t>2/10/2022</a:t>
+              <a:t>2/16/2022</a:t>
             </a:fld>
             <a:endParaRPr lang="en-US"/>
           </a:p>
@@ -12751,7 +12856,7 @@
           <a:p>
             <a:fld id="{9454E242-1075-47E0-A162-55C960B37C1C}" type="datetimeFigureOut">
               <a:rPr lang="en-US" smtClean="0"/>
-              <a:t>2/10/2022</a:t>
+              <a:t>2/16/2022</a:t>
             </a:fld>
             <a:endParaRPr lang="en-US"/>
           </a:p>
@@ -12929,7 +13034,7 @@
           <a:p>
             <a:fld id="{9454E242-1075-47E0-A162-55C960B37C1C}" type="datetimeFigureOut">
               <a:rPr lang="en-US" smtClean="0"/>
-              <a:t>2/10/2022</a:t>
+              <a:t>2/16/2022</a:t>
             </a:fld>
             <a:endParaRPr lang="en-US"/>
           </a:p>
@@ -13756,7 +13861,7 @@
               <a:pPr>
                 <a:defRPr/>
               </a:pPr>
-              <a:t>2/10/2022</a:t>
+              <a:t>2/16/2022</a:t>
             </a:fld>
             <a:endParaRPr lang="en-US"/>
           </a:p>
@@ -14087,7 +14192,7 @@
               <a:pPr>
                 <a:defRPr/>
               </a:pPr>
-              <a:t>2/10/2022</a:t>
+              <a:t>2/16/2022</a:t>
             </a:fld>
             <a:endParaRPr lang="en-US"/>
           </a:p>
@@ -14552,7 +14657,7 @@
               <a:pPr>
                 <a:defRPr/>
               </a:pPr>
-              <a:t>2/10/2022</a:t>
+              <a:t>2/16/2022</a:t>
             </a:fld>
             <a:endParaRPr lang="en-US"/>
           </a:p>
@@ -14715,7 +14820,7 @@
               <a:pPr>
                 <a:defRPr/>
               </a:pPr>
-              <a:t>2/10/2022</a:t>
+              <a:t>2/16/2022</a:t>
             </a:fld>
             <a:endParaRPr lang="en-US"/>
           </a:p>
@@ -14856,7 +14961,7 @@
               <a:pPr>
                 <a:defRPr/>
               </a:pPr>
-              <a:t>2/10/2022</a:t>
+              <a:t>2/16/2022</a:t>
             </a:fld>
             <a:endParaRPr lang="en-US"/>
           </a:p>
@@ -15147,7 +15252,7 @@
               <a:pPr>
                 <a:defRPr/>
               </a:pPr>
-              <a:t>2/10/2022</a:t>
+              <a:t>2/16/2022</a:t>
             </a:fld>
             <a:endParaRPr lang="en-US"/>
           </a:p>
@@ -15468,7 +15573,7 @@
               <a:pPr>
                 <a:defRPr/>
               </a:pPr>
-              <a:t>2/10/2022</a:t>
+              <a:t>2/16/2022</a:t>
             </a:fld>
             <a:endParaRPr lang="en-US"/>
           </a:p>
@@ -15769,7 +15874,7 @@
               <a:pPr>
                 <a:defRPr/>
               </a:pPr>
-              <a:t>2/10/2022</a:t>
+              <a:t>2/16/2022</a:t>
             </a:fld>
             <a:endParaRPr lang="en-US"/>
           </a:p>
@@ -15983,7 +16088,7 @@
               <a:pPr>
                 <a:defRPr/>
               </a:pPr>
-              <a:t>2/10/2022</a:t>
+              <a:t>2/16/2022</a:t>
             </a:fld>
             <a:endParaRPr lang="en-US"/>
           </a:p>
@@ -16207,7 +16312,7 @@
               <a:pPr>
                 <a:defRPr/>
               </a:pPr>
-              <a:t>2/10/2022</a:t>
+              <a:t>2/16/2022</a:t>
             </a:fld>
             <a:endParaRPr lang="en-US"/>
           </a:p>
@@ -16538,7 +16643,7 @@
               <a:pPr>
                 <a:defRPr/>
               </a:pPr>
-              <a:t>2/10/2022</a:t>
+              <a:t>2/16/2022</a:t>
             </a:fld>
             <a:endParaRPr lang="en-US"/>
           </a:p>
@@ -17003,7 +17108,7 @@
               <a:pPr>
                 <a:defRPr/>
               </a:pPr>
-              <a:t>2/10/2022</a:t>
+              <a:t>2/16/2022</a:t>
             </a:fld>
             <a:endParaRPr lang="en-US"/>
           </a:p>
@@ -17166,7 +17271,7 @@
               <a:pPr>
                 <a:defRPr/>
               </a:pPr>
-              <a:t>2/10/2022</a:t>
+              <a:t>2/16/2022</a:t>
             </a:fld>
             <a:endParaRPr lang="en-US"/>
           </a:p>
@@ -17307,7 +17412,7 @@
               <a:pPr>
                 <a:defRPr/>
               </a:pPr>
-              <a:t>2/10/2022</a:t>
+              <a:t>2/16/2022</a:t>
             </a:fld>
             <a:endParaRPr lang="en-US"/>
           </a:p>
@@ -17628,7 +17733,7 @@
               <a:pPr>
                 <a:defRPr/>
               </a:pPr>
-              <a:t>2/10/2022</a:t>
+              <a:t>2/16/2022</a:t>
             </a:fld>
             <a:endParaRPr lang="en-US"/>
           </a:p>
@@ -17929,7 +18034,7 @@
               <a:pPr>
                 <a:defRPr/>
               </a:pPr>
-              <a:t>2/10/2022</a:t>
+              <a:t>2/16/2022</a:t>
             </a:fld>
             <a:endParaRPr lang="en-US"/>
           </a:p>
@@ -19099,7 +19204,7 @@
           <a:p>
             <a:fld id="{9454E242-1075-47E0-A162-55C960B37C1C}" type="datetimeFigureOut">
               <a:rPr lang="en-US" smtClean="0"/>
-              <a:t>2/10/2022</a:t>
+              <a:t>2/16/2022</a:t>
             </a:fld>
             <a:endParaRPr lang="en-US"/>
           </a:p>
@@ -33219,6 +33324,11 @@
   <p:clrMapOvr>
     <a:masterClrMapping/>
   </p:clrMapOvr>
+  <p:extLst>
+    <p:ext uri="{6950BFC3-D8DA-4A85-94F7-54DA5524770B}">
+      <p188:commentRel xmlns:p188="http://schemas.microsoft.com/office/powerpoint/2018/8/main" r:id="rId3"/>
+    </p:ext>
+  </p:extLst>
 </p:sld>
 </file>
 
@@ -34588,6 +34698,11 @@
   <p:clrMapOvr>
     <a:masterClrMapping/>
   </p:clrMapOvr>
+  <p:extLst>
+    <p:ext uri="{6950BFC3-D8DA-4A85-94F7-54DA5524770B}">
+      <p188:commentRel xmlns:p188="http://schemas.microsoft.com/office/powerpoint/2018/8/main" r:id="rId3"/>
+    </p:ext>
+  </p:extLst>
 </p:sld>
 </file>
 
@@ -36505,6 +36620,11 @@
   <p:clrMapOvr>
     <a:masterClrMapping/>
   </p:clrMapOvr>
+  <p:extLst>
+    <p:ext uri="{6950BFC3-D8DA-4A85-94F7-54DA5524770B}">
+      <p188:commentRel xmlns:p188="http://schemas.microsoft.com/office/powerpoint/2018/8/main" r:id="rId3"/>
+    </p:ext>
+  </p:extLst>
 </p:sld>
 </file>
 
@@ -37069,7 +37189,7 @@
           <p:nvPr/>
         </p:nvPicPr>
         <p:blipFill>
-          <a:blip r:embed="rId2">
+          <a:blip r:embed="rId3">
             <a:extLst>
               <a:ext uri="{28A0092B-C50C-407E-A947-70E740481C1C}">
                 <a14:useLocalDpi xmlns:a14="http://schemas.microsoft.com/office/drawing/2010/main" val="0"/>
@@ -37123,7 +37243,7 @@
           <p:nvPr/>
         </p:nvPicPr>
         <p:blipFill>
-          <a:blip r:embed="rId2">
+          <a:blip r:embed="rId3">
             <a:extLst>
               <a:ext uri="{28A0092B-C50C-407E-A947-70E740481C1C}">
                 <a14:useLocalDpi xmlns:a14="http://schemas.microsoft.com/office/drawing/2010/main" val="0"/>
@@ -37178,6 +37298,11 @@
   <p:clrMapOvr>
     <a:masterClrMapping/>
   </p:clrMapOvr>
+  <p:extLst>
+    <p:ext uri="{6950BFC3-D8DA-4A85-94F7-54DA5524770B}">
+      <p188:commentRel xmlns:p188="http://schemas.microsoft.com/office/powerpoint/2018/8/main" r:id="rId2"/>
+    </p:ext>
+  </p:extLst>
 </p:sld>
 </file>
 

</xml_diff>